<commit_message>
Fix CodeBuild -> Secrets Manager arrow direction
</commit_message>
<xml_diff>
--- a/docs/deployment_guide/images/liquibase-pro-architecture-diagram.pptx
+++ b/docs/deployment_guide/images/liquibase-pro-architecture-diagram.pptx
@@ -243,7 +243,7 @@
           <a:p>
             <a:fld id="{750E135F-4414-4FD1-807A-B7DF781150A9}" type="datetimeFigureOut">
               <a:rPr lang="en-US" smtClean="0"/>
-              <a:t>4/6/2022</a:t>
+              <a:t>2022-04-08</a:t>
             </a:fld>
             <a:endParaRPr lang="en-US"/>
           </a:p>
@@ -413,7 +413,7 @@
           <a:p>
             <a:fld id="{750E135F-4414-4FD1-807A-B7DF781150A9}" type="datetimeFigureOut">
               <a:rPr lang="en-US" smtClean="0"/>
-              <a:t>4/6/2022</a:t>
+              <a:t>2022-04-08</a:t>
             </a:fld>
             <a:endParaRPr lang="en-US"/>
           </a:p>
@@ -593,7 +593,7 @@
           <a:p>
             <a:fld id="{750E135F-4414-4FD1-807A-B7DF781150A9}" type="datetimeFigureOut">
               <a:rPr lang="en-US" smtClean="0"/>
-              <a:t>4/6/2022</a:t>
+              <a:t>2022-04-08</a:t>
             </a:fld>
             <a:endParaRPr lang="en-US"/>
           </a:p>
@@ -763,7 +763,7 @@
           <a:p>
             <a:fld id="{750E135F-4414-4FD1-807A-B7DF781150A9}" type="datetimeFigureOut">
               <a:rPr lang="en-US" smtClean="0"/>
-              <a:t>4/6/2022</a:t>
+              <a:t>2022-04-08</a:t>
             </a:fld>
             <a:endParaRPr lang="en-US"/>
           </a:p>
@@ -1007,7 +1007,7 @@
           <a:p>
             <a:fld id="{750E135F-4414-4FD1-807A-B7DF781150A9}" type="datetimeFigureOut">
               <a:rPr lang="en-US" smtClean="0"/>
-              <a:t>4/6/2022</a:t>
+              <a:t>2022-04-08</a:t>
             </a:fld>
             <a:endParaRPr lang="en-US"/>
           </a:p>
@@ -1239,7 +1239,7 @@
           <a:p>
             <a:fld id="{750E135F-4414-4FD1-807A-B7DF781150A9}" type="datetimeFigureOut">
               <a:rPr lang="en-US" smtClean="0"/>
-              <a:t>4/6/2022</a:t>
+              <a:t>2022-04-08</a:t>
             </a:fld>
             <a:endParaRPr lang="en-US"/>
           </a:p>
@@ -1606,7 +1606,7 @@
           <a:p>
             <a:fld id="{750E135F-4414-4FD1-807A-B7DF781150A9}" type="datetimeFigureOut">
               <a:rPr lang="en-US" smtClean="0"/>
-              <a:t>4/6/2022</a:t>
+              <a:t>2022-04-08</a:t>
             </a:fld>
             <a:endParaRPr lang="en-US"/>
           </a:p>
@@ -1724,7 +1724,7 @@
           <a:p>
             <a:fld id="{750E135F-4414-4FD1-807A-B7DF781150A9}" type="datetimeFigureOut">
               <a:rPr lang="en-US" smtClean="0"/>
-              <a:t>4/6/2022</a:t>
+              <a:t>2022-04-08</a:t>
             </a:fld>
             <a:endParaRPr lang="en-US"/>
           </a:p>
@@ -1819,7 +1819,7 @@
           <a:p>
             <a:fld id="{750E135F-4414-4FD1-807A-B7DF781150A9}" type="datetimeFigureOut">
               <a:rPr lang="en-US" smtClean="0"/>
-              <a:t>4/6/2022</a:t>
+              <a:t>2022-04-08</a:t>
             </a:fld>
             <a:endParaRPr lang="en-US"/>
           </a:p>
@@ -2096,7 +2096,7 @@
           <a:p>
             <a:fld id="{750E135F-4414-4FD1-807A-B7DF781150A9}" type="datetimeFigureOut">
               <a:rPr lang="en-US" smtClean="0"/>
-              <a:t>4/6/2022</a:t>
+              <a:t>2022-04-08</a:t>
             </a:fld>
             <a:endParaRPr lang="en-US"/>
           </a:p>
@@ -2353,7 +2353,7 @@
           <a:p>
             <a:fld id="{750E135F-4414-4FD1-807A-B7DF781150A9}" type="datetimeFigureOut">
               <a:rPr lang="en-US" smtClean="0"/>
-              <a:t>4/6/2022</a:t>
+              <a:t>2022-04-08</a:t>
             </a:fld>
             <a:endParaRPr lang="en-US"/>
           </a:p>
@@ -2566,7 +2566,7 @@
           <a:p>
             <a:fld id="{750E135F-4414-4FD1-807A-B7DF781150A9}" type="datetimeFigureOut">
               <a:rPr lang="en-US" smtClean="0"/>
-              <a:t>4/6/2022</a:t>
+              <a:t>2022-04-08</a:t>
             </a:fld>
             <a:endParaRPr lang="en-US"/>
           </a:p>
@@ -6208,13 +6208,13 @@
           </p:cNvPr>
           <p:cNvCxnSpPr>
             <a:cxnSpLocks/>
-            <a:stCxn id="119" idx="3"/>
-            <a:endCxn id="58" idx="1"/>
+            <a:stCxn id="58" idx="1"/>
+            <a:endCxn id="119" idx="3"/>
           </p:cNvCxnSpPr>
           <p:nvPr/>
         </p:nvCxnSpPr>
         <p:spPr>
-          <a:xfrm>
+          <a:xfrm flipH="1" flipV="1">
             <a:off x="3596640" y="4678680"/>
             <a:ext cx="792480" cy="318"/>
           </a:xfrm>

</xml_diff>

<commit_message>
Replace CloudWatch Events with EventBridge
</commit_message>
<xml_diff>
--- a/docs/deployment_guide/images/liquibase-pro-architecture-diagram.pptx
+++ b/docs/deployment_guide/images/liquibase-pro-architecture-diagram.pptx
@@ -243,7 +243,7 @@
           <a:p>
             <a:fld id="{750E135F-4414-4FD1-807A-B7DF781150A9}" type="datetimeFigureOut">
               <a:rPr lang="en-US" smtClean="0"/>
-              <a:t>2022-04-08</a:t>
+              <a:t>2022-04-10</a:t>
             </a:fld>
             <a:endParaRPr lang="en-US"/>
           </a:p>
@@ -413,7 +413,7 @@
           <a:p>
             <a:fld id="{750E135F-4414-4FD1-807A-B7DF781150A9}" type="datetimeFigureOut">
               <a:rPr lang="en-US" smtClean="0"/>
-              <a:t>2022-04-08</a:t>
+              <a:t>2022-04-10</a:t>
             </a:fld>
             <a:endParaRPr lang="en-US"/>
           </a:p>
@@ -593,7 +593,7 @@
           <a:p>
             <a:fld id="{750E135F-4414-4FD1-807A-B7DF781150A9}" type="datetimeFigureOut">
               <a:rPr lang="en-US" smtClean="0"/>
-              <a:t>2022-04-08</a:t>
+              <a:t>2022-04-10</a:t>
             </a:fld>
             <a:endParaRPr lang="en-US"/>
           </a:p>
@@ -763,7 +763,7 @@
           <a:p>
             <a:fld id="{750E135F-4414-4FD1-807A-B7DF781150A9}" type="datetimeFigureOut">
               <a:rPr lang="en-US" smtClean="0"/>
-              <a:t>2022-04-08</a:t>
+              <a:t>2022-04-10</a:t>
             </a:fld>
             <a:endParaRPr lang="en-US"/>
           </a:p>
@@ -1007,7 +1007,7 @@
           <a:p>
             <a:fld id="{750E135F-4414-4FD1-807A-B7DF781150A9}" type="datetimeFigureOut">
               <a:rPr lang="en-US" smtClean="0"/>
-              <a:t>2022-04-08</a:t>
+              <a:t>2022-04-10</a:t>
             </a:fld>
             <a:endParaRPr lang="en-US"/>
           </a:p>
@@ -1239,7 +1239,7 @@
           <a:p>
             <a:fld id="{750E135F-4414-4FD1-807A-B7DF781150A9}" type="datetimeFigureOut">
               <a:rPr lang="en-US" smtClean="0"/>
-              <a:t>2022-04-08</a:t>
+              <a:t>2022-04-10</a:t>
             </a:fld>
             <a:endParaRPr lang="en-US"/>
           </a:p>
@@ -1606,7 +1606,7 @@
           <a:p>
             <a:fld id="{750E135F-4414-4FD1-807A-B7DF781150A9}" type="datetimeFigureOut">
               <a:rPr lang="en-US" smtClean="0"/>
-              <a:t>2022-04-08</a:t>
+              <a:t>2022-04-10</a:t>
             </a:fld>
             <a:endParaRPr lang="en-US"/>
           </a:p>
@@ -1724,7 +1724,7 @@
           <a:p>
             <a:fld id="{750E135F-4414-4FD1-807A-B7DF781150A9}" type="datetimeFigureOut">
               <a:rPr lang="en-US" smtClean="0"/>
-              <a:t>2022-04-08</a:t>
+              <a:t>2022-04-10</a:t>
             </a:fld>
             <a:endParaRPr lang="en-US"/>
           </a:p>
@@ -1819,7 +1819,7 @@
           <a:p>
             <a:fld id="{750E135F-4414-4FD1-807A-B7DF781150A9}" type="datetimeFigureOut">
               <a:rPr lang="en-US" smtClean="0"/>
-              <a:t>2022-04-08</a:t>
+              <a:t>2022-04-10</a:t>
             </a:fld>
             <a:endParaRPr lang="en-US"/>
           </a:p>
@@ -2096,7 +2096,7 @@
           <a:p>
             <a:fld id="{750E135F-4414-4FD1-807A-B7DF781150A9}" type="datetimeFigureOut">
               <a:rPr lang="en-US" smtClean="0"/>
-              <a:t>2022-04-08</a:t>
+              <a:t>2022-04-10</a:t>
             </a:fld>
             <a:endParaRPr lang="en-US"/>
           </a:p>
@@ -2353,7 +2353,7 @@
           <a:p>
             <a:fld id="{750E135F-4414-4FD1-807A-B7DF781150A9}" type="datetimeFigureOut">
               <a:rPr lang="en-US" smtClean="0"/>
-              <a:t>2022-04-08</a:t>
+              <a:t>2022-04-10</a:t>
             </a:fld>
             <a:endParaRPr lang="en-US"/>
           </a:p>
@@ -2566,7 +2566,7 @@
           <a:p>
             <a:fld id="{750E135F-4414-4FD1-807A-B7DF781150A9}" type="datetimeFigureOut">
               <a:rPr lang="en-US" smtClean="0"/>
-              <a:t>2022-04-08</a:t>
+              <a:t>2022-04-10</a:t>
             </a:fld>
             <a:endParaRPr lang="en-US"/>
           </a:p>
@@ -3629,66 +3629,6 @@
           </a:p>
         </p:txBody>
       </p:sp>
-      <p:pic>
-        <p:nvPicPr>
-          <p:cNvPr id="96" name="Graphic 17">
-            <a:extLst>
-              <a:ext uri="{FF2B5EF4-FFF2-40B4-BE49-F238E27FC236}">
-                <a16:creationId xmlns:a16="http://schemas.microsoft.com/office/drawing/2014/main" id="{6AA334FE-0A43-4B45-983E-2B4E3538F8C4}"/>
-              </a:ext>
-            </a:extLst>
-          </p:cNvPr>
-          <p:cNvPicPr>
-            <a:picLocks noChangeAspect="1" noChangeArrowheads="1"/>
-          </p:cNvPicPr>
-          <p:nvPr/>
-        </p:nvPicPr>
-        <p:blipFill>
-          <a:blip r:embed="rId9">
-            <a:extLst>
-              <a:ext uri="{28A0092B-C50C-407E-A947-70E740481C1C}">
-                <a14:useLocalDpi xmlns:a14="http://schemas.microsoft.com/office/drawing/2010/main" val="0"/>
-              </a:ext>
-            </a:extLst>
-          </a:blip>
-          <a:srcRect/>
-          <a:stretch>
-            <a:fillRect/>
-          </a:stretch>
-        </p:blipFill>
-        <p:spPr bwMode="auto">
-          <a:xfrm>
-            <a:off x="2834640" y="7589520"/>
-            <a:ext cx="762000" cy="762000"/>
-          </a:xfrm>
-          <a:prstGeom prst="rect">
-            <a:avLst/>
-          </a:prstGeom>
-          <a:noFill/>
-          <a:ln>
-            <a:noFill/>
-          </a:ln>
-          <a:extLst>
-            <a:ext uri="{909E8E84-426E-40DD-AFC4-6F175D3DCCD1}">
-              <a14:hiddenFill xmlns:a14="http://schemas.microsoft.com/office/drawing/2010/main">
-                <a:solidFill>
-                  <a:srgbClr val="FFFFFF"/>
-                </a:solidFill>
-              </a14:hiddenFill>
-            </a:ext>
-            <a:ext uri="{91240B29-F687-4F45-9708-019B960494DF}">
-              <a14:hiddenLine xmlns:a14="http://schemas.microsoft.com/office/drawing/2010/main" w="9525">
-                <a:solidFill>
-                  <a:srgbClr val="000000"/>
-                </a:solidFill>
-                <a:miter lim="800000"/>
-                <a:headEnd/>
-                <a:tailEnd/>
-              </a14:hiddenLine>
-            </a:ext>
-          </a:extLst>
-        </p:spPr>
-      </p:pic>
       <p:sp>
         <p:nvSpPr>
           <p:cNvPr id="97" name="TextBox 9">
@@ -3840,12 +3780,20 @@
           <a:p>
             <a:pPr algn="ctr" eaLnBrk="1" hangingPunct="1"/>
             <a:r>
-              <a:rPr lang="en-US" altLang="en-US" sz="1200">
+              <a:rPr lang="en-US" altLang="en-US" sz="1200" dirty="0">
                 <a:latin typeface="Arial" panose="020B0604020202020204" pitchFamily="34" charset="0"/>
                 <a:ea typeface="Amazon Ember" panose="020B0603020204020204" pitchFamily="34" charset="0"/>
                 <a:cs typeface="Arial" panose="020B0604020202020204" pitchFamily="34" charset="0"/>
               </a:rPr>
-              <a:t>Amazon CloudWatch</a:t>
+              <a:t>Amazon </a:t>
+            </a:r>
+            <a:r>
+              <a:rPr lang="en-US" altLang="en-US" sz="1200" dirty="0" err="1">
+                <a:latin typeface="Arial" panose="020B0604020202020204" pitchFamily="34" charset="0"/>
+                <a:ea typeface="Amazon Ember" panose="020B0603020204020204" pitchFamily="34" charset="0"/>
+                <a:cs typeface="Arial" panose="020B0604020202020204" pitchFamily="34" charset="0"/>
+              </a:rPr>
+              <a:t>EventBridge</a:t>
             </a:r>
             <a:endParaRPr lang="en-US" altLang="en-US" sz="1200" dirty="0">
               <a:latin typeface="Arial" panose="020B0604020202020204" pitchFamily="34" charset="0"/>
@@ -3870,7 +3818,7 @@
           <p:nvPr/>
         </p:nvPicPr>
         <p:blipFill>
-          <a:blip r:embed="rId10">
+          <a:blip r:embed="rId9">
             <a:extLst>
               <a:ext uri="{28A0092B-C50C-407E-A947-70E740481C1C}">
                 <a14:useLocalDpi xmlns:a14="http://schemas.microsoft.com/office/drawing/2010/main" val="0"/>
@@ -3930,7 +3878,7 @@
           <p:nvPr/>
         </p:nvPicPr>
         <p:blipFill>
-          <a:blip r:embed="rId11">
+          <a:blip r:embed="rId10">
             <a:extLst>
               <a:ext uri="{28A0092B-C50C-407E-A947-70E740481C1C}">
                 <a14:useLocalDpi xmlns:a14="http://schemas.microsoft.com/office/drawing/2010/main" val="0"/>
@@ -4293,10 +4241,10 @@
           <p:nvPr/>
         </p:nvPicPr>
         <p:blipFill>
-          <a:blip r:embed="rId12">
+          <a:blip r:embed="rId11">
             <a:extLst>
               <a:ext uri="{96DAC541-7B7A-43D3-8B79-37D633B846F1}">
-                <asvg:svgBlip xmlns:asvg="http://schemas.microsoft.com/office/drawing/2016/SVG/main" r:embed="rId13"/>
+                <asvg:svgBlip xmlns:asvg="http://schemas.microsoft.com/office/drawing/2016/SVG/main" r:embed="rId12"/>
               </a:ext>
             </a:extLst>
           </a:blip>
@@ -4329,7 +4277,7 @@
           <p:nvPr/>
         </p:nvPicPr>
         <p:blipFill>
-          <a:blip r:embed="rId14">
+          <a:blip r:embed="rId13">
             <a:extLst>
               <a:ext uri="{28A0092B-C50C-407E-A947-70E740481C1C}">
                 <a14:useLocalDpi xmlns:a14="http://schemas.microsoft.com/office/drawing/2010/main" val="0"/>
@@ -4526,10 +4474,10 @@
           <p:nvPr/>
         </p:nvPicPr>
         <p:blipFill>
-          <a:blip r:embed="rId15">
+          <a:blip r:embed="rId14">
             <a:extLst>
               <a:ext uri="{96DAC541-7B7A-43D3-8B79-37D633B846F1}">
-                <asvg:svgBlip xmlns:asvg="http://schemas.microsoft.com/office/drawing/2016/SVG/main" r:embed="rId16"/>
+                <asvg:svgBlip xmlns:asvg="http://schemas.microsoft.com/office/drawing/2016/SVG/main" r:embed="rId15"/>
               </a:ext>
             </a:extLst>
           </a:blip>
@@ -4903,14 +4851,14 @@
           <p:cNvCxnSpPr>
             <a:cxnSpLocks/>
             <a:stCxn id="95" idx="2"/>
-            <a:endCxn id="96" idx="0"/>
+            <a:endCxn id="53" idx="0"/>
           </p:cNvCxnSpPr>
           <p:nvPr/>
         </p:nvCxnSpPr>
         <p:spPr>
           <a:xfrm>
             <a:off x="3215640" y="6984981"/>
-            <a:ext cx="0" cy="604539"/>
+            <a:ext cx="4572" cy="604223"/>
           </a:xfrm>
           <a:prstGeom prst="straightConnector1">
             <a:avLst/>
@@ -4949,15 +4897,15 @@
           </p:cNvPr>
           <p:cNvCxnSpPr>
             <a:cxnSpLocks/>
-            <a:stCxn id="96" idx="3"/>
+            <a:stCxn id="53" idx="3"/>
             <a:endCxn id="98" idx="1"/>
           </p:cNvCxnSpPr>
           <p:nvPr/>
         </p:nvCxnSpPr>
         <p:spPr>
           <a:xfrm>
-            <a:off x="3596640" y="7970520"/>
-            <a:ext cx="1414272" cy="0"/>
+            <a:off x="3601212" y="7970204"/>
+            <a:ext cx="1409700" cy="316"/>
           </a:xfrm>
           <a:prstGeom prst="straightConnector1">
             <a:avLst/>
@@ -5047,10 +4995,10 @@
           <p:nvPr/>
         </p:nvPicPr>
         <p:blipFill>
-          <a:blip r:embed="rId17">
+          <a:blip r:embed="rId16">
             <a:extLst>
               <a:ext uri="{96DAC541-7B7A-43D3-8B79-37D633B846F1}">
-                <asvg:svgBlip xmlns:asvg="http://schemas.microsoft.com/office/drawing/2016/SVG/main" r:embed="rId18"/>
+                <asvg:svgBlip xmlns:asvg="http://schemas.microsoft.com/office/drawing/2016/SVG/main" r:embed="rId17"/>
               </a:ext>
             </a:extLst>
           </a:blip>
@@ -5268,7 +5216,7 @@
           <p:nvPr/>
         </p:nvPicPr>
         <p:blipFill>
-          <a:blip r:embed="rId19">
+          <a:blip r:embed="rId18">
             <a:extLst>
               <a:ext uri="{28A0092B-C50C-407E-A947-70E740481C1C}">
                 <a14:useLocalDpi xmlns:a14="http://schemas.microsoft.com/office/drawing/2010/main" val="0"/>
@@ -5792,10 +5740,10 @@
           <p:nvPr/>
         </p:nvPicPr>
         <p:blipFill>
-          <a:blip r:embed="rId17">
+          <a:blip r:embed="rId16">
             <a:extLst>
               <a:ext uri="{96DAC541-7B7A-43D3-8B79-37D633B846F1}">
-                <asvg:svgBlip xmlns:asvg="http://schemas.microsoft.com/office/drawing/2016/SVG/main" r:embed="rId18"/>
+                <asvg:svgBlip xmlns:asvg="http://schemas.microsoft.com/office/drawing/2016/SVG/main" r:embed="rId17"/>
               </a:ext>
             </a:extLst>
           </a:blip>
@@ -6176,7 +6124,7 @@
           <p:nvPr/>
         </p:nvPicPr>
         <p:blipFill>
-          <a:blip r:embed="rId20">
+          <a:blip r:embed="rId19">
             <a:extLst>
               <a:ext uri="{28A0092B-C50C-407E-A947-70E740481C1C}">
                 <a14:useLocalDpi xmlns:a14="http://schemas.microsoft.com/office/drawing/2010/main" val="0"/>
@@ -6308,7 +6256,7 @@
           <p:nvPr/>
         </p:nvPicPr>
         <p:blipFill>
-          <a:blip r:embed="rId21">
+          <a:blip r:embed="rId20">
             <a:extLst>
               <a:ext uri="{28A0092B-C50C-407E-A947-70E740481C1C}">
                 <a14:useLocalDpi xmlns:a14="http://schemas.microsoft.com/office/drawing/2010/main" val="0"/>
@@ -6529,10 +6477,10 @@
           <p:nvPr/>
         </p:nvPicPr>
         <p:blipFill>
-          <a:blip r:embed="rId15">
+          <a:blip r:embed="rId14">
             <a:extLst>
               <a:ext uri="{96DAC541-7B7A-43D3-8B79-37D633B846F1}">
-                <asvg:svgBlip xmlns:asvg="http://schemas.microsoft.com/office/drawing/2016/SVG/main" r:embed="rId16"/>
+                <asvg:svgBlip xmlns:asvg="http://schemas.microsoft.com/office/drawing/2016/SVG/main" r:embed="rId15"/>
               </a:ext>
             </a:extLst>
           </a:blip>
@@ -6748,10 +6696,10 @@
           <p:nvPr/>
         </p:nvPicPr>
         <p:blipFill>
-          <a:blip r:embed="rId15">
+          <a:blip r:embed="rId14">
             <a:extLst>
               <a:ext uri="{96DAC541-7B7A-43D3-8B79-37D633B846F1}">
-                <asvg:svgBlip xmlns:asvg="http://schemas.microsoft.com/office/drawing/2016/SVG/main" r:embed="rId16"/>
+                <asvg:svgBlip xmlns:asvg="http://schemas.microsoft.com/office/drawing/2016/SVG/main" r:embed="rId15"/>
               </a:ext>
             </a:extLst>
           </a:blip>
@@ -6806,10 +6754,10 @@
           <p:nvPr/>
         </p:nvPicPr>
         <p:blipFill>
-          <a:blip r:embed="rId17">
+          <a:blip r:embed="rId16">
             <a:extLst>
               <a:ext uri="{96DAC541-7B7A-43D3-8B79-37D633B846F1}">
-                <asvg:svgBlip xmlns:asvg="http://schemas.microsoft.com/office/drawing/2016/SVG/main" r:embed="rId18"/>
+                <asvg:svgBlip xmlns:asvg="http://schemas.microsoft.com/office/drawing/2016/SVG/main" r:embed="rId17"/>
               </a:ext>
             </a:extLst>
           </a:blip>
@@ -7154,6 +7102,66 @@
           </a:p>
         </p:txBody>
       </p:sp>
+      <p:pic>
+        <p:nvPicPr>
+          <p:cNvPr id="53" name="Graphic 19">
+            <a:extLst>
+              <a:ext uri="{FF2B5EF4-FFF2-40B4-BE49-F238E27FC236}">
+                <a16:creationId xmlns:a16="http://schemas.microsoft.com/office/drawing/2014/main" id="{6C0DB9AA-8436-4A59-8322-B07BD88FE7A6}"/>
+              </a:ext>
+            </a:extLst>
+          </p:cNvPr>
+          <p:cNvPicPr>
+            <a:picLocks noChangeAspect="1" noChangeArrowheads="1"/>
+          </p:cNvPicPr>
+          <p:nvPr/>
+        </p:nvPicPr>
+        <p:blipFill>
+          <a:blip r:embed="rId21">
+            <a:extLst>
+              <a:ext uri="{28A0092B-C50C-407E-A947-70E740481C1C}">
+                <a14:useLocalDpi xmlns:a14="http://schemas.microsoft.com/office/drawing/2010/main" val="0"/>
+              </a:ext>
+            </a:extLst>
+          </a:blip>
+          <a:srcRect/>
+          <a:stretch>
+            <a:fillRect/>
+          </a:stretch>
+        </p:blipFill>
+        <p:spPr bwMode="auto">
+          <a:xfrm>
+            <a:off x="2839212" y="7589204"/>
+            <a:ext cx="762000" cy="762000"/>
+          </a:xfrm>
+          <a:prstGeom prst="rect">
+            <a:avLst/>
+          </a:prstGeom>
+          <a:noFill/>
+          <a:ln>
+            <a:noFill/>
+          </a:ln>
+          <a:extLst>
+            <a:ext uri="{909E8E84-426E-40DD-AFC4-6F175D3DCCD1}">
+              <a14:hiddenFill xmlns:a14="http://schemas.microsoft.com/office/drawing/2010/main">
+                <a:solidFill>
+                  <a:srgbClr val="FFFFFF"/>
+                </a:solidFill>
+              </a14:hiddenFill>
+            </a:ext>
+            <a:ext uri="{91240B29-F687-4F45-9708-019B960494DF}">
+              <a14:hiddenLine xmlns:a14="http://schemas.microsoft.com/office/drawing/2010/main" w="9525">
+                <a:solidFill>
+                  <a:srgbClr val="000000"/>
+                </a:solidFill>
+                <a:miter lim="800000"/>
+                <a:headEnd/>
+                <a:tailEnd/>
+              </a14:hiddenLine>
+            </a:ext>
+          </a:extLst>
+        </p:spPr>
+      </p:pic>
     </p:spTree>
     <p:extLst>
       <p:ext uri="{BB962C8B-B14F-4D97-AF65-F5344CB8AC3E}">

</xml_diff>